<commit_message>
updates on lecture 2
</commit_message>
<xml_diff>
--- a/Lecture02_UnivariateOLS/Lecture2_OLS_2022F.pptx
+++ b/Lecture02_UnivariateOLS/Lecture2_OLS_2022F.pptx
@@ -254,7 +254,7 @@
           <a:p>
             <a:fld id="{EF911157-0FC2-4F06-8D61-FD647FE4E19D}" type="datetimeFigureOut">
               <a:rPr lang="en-US" smtClean="0"/>
-              <a:t>9/19/2022</a:t>
+              <a:t>2023-09-21</a:t>
             </a:fld>
             <a:endParaRPr lang="en-US"/>
           </a:p>
@@ -4637,7 +4637,7 @@
             <a:fld id="{0972D05C-DCFB-4BB6-B49C-AC126BF3ED2C}" type="datetimeFigureOut">
               <a:rPr lang="en-US" smtClean="0"/>
               <a:pPr/>
-              <a:t>9/19/2022</a:t>
+              <a:t>2023-09-21</a:t>
             </a:fld>
             <a:endParaRPr lang="en-US"/>
           </a:p>
@@ -4867,7 +4867,7 @@
             <a:fld id="{0972D05C-DCFB-4BB6-B49C-AC126BF3ED2C}" type="datetimeFigureOut">
               <a:rPr lang="en-US" smtClean="0"/>
               <a:pPr/>
-              <a:t>9/19/2022</a:t>
+              <a:t>2023-09-21</a:t>
             </a:fld>
             <a:endParaRPr lang="en-US"/>
           </a:p>
@@ -5049,7 +5049,7 @@
             <a:fld id="{0972D05C-DCFB-4BB6-B49C-AC126BF3ED2C}" type="datetimeFigureOut">
               <a:rPr lang="en-US" smtClean="0"/>
               <a:pPr/>
-              <a:t>9/19/2022</a:t>
+              <a:t>2023-09-21</a:t>
             </a:fld>
             <a:endParaRPr lang="en-US"/>
           </a:p>
@@ -5221,7 +5221,7 @@
             <a:fld id="{0972D05C-DCFB-4BB6-B49C-AC126BF3ED2C}" type="datetimeFigureOut">
               <a:rPr lang="en-US" smtClean="0"/>
               <a:pPr/>
-              <a:t>9/19/2022</a:t>
+              <a:t>2023-09-21</a:t>
             </a:fld>
             <a:endParaRPr lang="en-US"/>
           </a:p>
@@ -5477,7 +5477,7 @@
             <a:fld id="{0972D05C-DCFB-4BB6-B49C-AC126BF3ED2C}" type="datetimeFigureOut">
               <a:rPr lang="en-US" smtClean="0"/>
               <a:pPr/>
-              <a:t>9/19/2022</a:t>
+              <a:t>2023-09-21</a:t>
             </a:fld>
             <a:endParaRPr lang="en-US"/>
           </a:p>
@@ -5805,7 +5805,7 @@
             <a:fld id="{0972D05C-DCFB-4BB6-B49C-AC126BF3ED2C}" type="datetimeFigureOut">
               <a:rPr lang="en-US" smtClean="0"/>
               <a:pPr/>
-              <a:t>9/19/2022</a:t>
+              <a:t>2023-09-21</a:t>
             </a:fld>
             <a:endParaRPr lang="en-US"/>
           </a:p>
@@ -6258,7 +6258,7 @@
             <a:fld id="{0972D05C-DCFB-4BB6-B49C-AC126BF3ED2C}" type="datetimeFigureOut">
               <a:rPr lang="en-US" smtClean="0"/>
               <a:pPr/>
-              <a:t>9/19/2022</a:t>
+              <a:t>2023-09-21</a:t>
             </a:fld>
             <a:endParaRPr lang="en-US"/>
           </a:p>
@@ -6378,7 +6378,7 @@
             <a:fld id="{0972D05C-DCFB-4BB6-B49C-AC126BF3ED2C}" type="datetimeFigureOut">
               <a:rPr lang="en-US" smtClean="0"/>
               <a:pPr/>
-              <a:t>9/19/2022</a:t>
+              <a:t>2023-09-21</a:t>
             </a:fld>
             <a:endParaRPr lang="en-US"/>
           </a:p>
@@ -6475,7 +6475,7 @@
             <a:fld id="{0972D05C-DCFB-4BB6-B49C-AC126BF3ED2C}" type="datetimeFigureOut">
               <a:rPr lang="en-US" smtClean="0"/>
               <a:pPr/>
-              <a:t>9/19/2022</a:t>
+              <a:t>2023-09-21</a:t>
             </a:fld>
             <a:endParaRPr lang="en-US"/>
           </a:p>
@@ -6764,7 +6764,7 @@
             <a:fld id="{0972D05C-DCFB-4BB6-B49C-AC126BF3ED2C}" type="datetimeFigureOut">
               <a:rPr lang="en-US" smtClean="0"/>
               <a:pPr/>
-              <a:t>9/19/2022</a:t>
+              <a:t>2023-09-21</a:t>
             </a:fld>
             <a:endParaRPr lang="en-US"/>
           </a:p>
@@ -7088,7 +7088,7 @@
             <a:fld id="{0972D05C-DCFB-4BB6-B49C-AC126BF3ED2C}" type="datetimeFigureOut">
               <a:rPr lang="en-US" smtClean="0"/>
               <a:pPr/>
-              <a:t>9/19/2022</a:t>
+              <a:t>2023-09-21</a:t>
             </a:fld>
             <a:endParaRPr lang="en-US"/>
           </a:p>
@@ -7343,7 +7343,7 @@
             <a:fld id="{0972D05C-DCFB-4BB6-B49C-AC126BF3ED2C}" type="datetimeFigureOut">
               <a:rPr lang="en-US" smtClean="0"/>
               <a:pPr/>
-              <a:t>9/19/2022</a:t>
+              <a:t>2023-09-21</a:t>
             </a:fld>
             <a:endParaRPr lang="en-US" dirty="0"/>
           </a:p>
@@ -7893,7 +7893,7 @@
           <a:p>
             <a:r>
               <a:rPr lang="en-US" sz="2400" dirty="0"/>
-              <a:t>September 16, 2022</a:t>
+              <a:t>September 22, 2023</a:t>
             </a:r>
           </a:p>
           <a:p>
@@ -7912,7 +7912,7 @@
             </a:r>
             <a:r>
               <a:rPr lang="en-US" sz="2400" dirty="0"/>
-              <a:t>Alex Hoagland, Ph.D.</a:t>
+              <a:t>Petros Pechlivanoglou, Ph.D. (based on Alex Hoagland’s work)</a:t>
             </a:r>
           </a:p>
         </p:txBody>
@@ -8460,8 +8460,8 @@
           </a:p>
         </p:txBody>
       </p:sp>
-      <mc:AlternateContent xmlns:mc="http://schemas.openxmlformats.org/markup-compatibility/2006" xmlns:a14="http://schemas.microsoft.com/office/drawing/2010/main">
-        <mc:Choice Requires="a14">
+      <mc:AlternateContent xmlns:mc="http://schemas.openxmlformats.org/markup-compatibility/2006">
+        <mc:Choice xmlns:a14="http://schemas.microsoft.com/office/drawing/2010/main" Requires="a14">
           <p:sp>
             <p:nvSpPr>
               <p:cNvPr id="3" name="Content Placeholder 2"/>
@@ -8935,7 +8935,7 @@
                         <m:t>⇔</m:t>
                       </m:r>
                       <m:r>
-                        <a:rPr lang="en-US" sz="2400" b="0" i="1" smtClean="0">
+                        <a:rPr lang="en-US" sz="2400" i="1">
                           <a:latin typeface="Cambria Math" panose="02040503050406030204" pitchFamily="18" charset="0"/>
                           <a:cs typeface="Times New Roman" panose="02020603050405020304" pitchFamily="18" charset="0"/>
                         </a:rPr>
@@ -8944,7 +8944,7 @@
                       <m:d>
                         <m:dPr>
                           <m:ctrlPr>
-                            <a:rPr lang="en-US" sz="2400" b="0" i="1" smtClean="0">
+                            <a:rPr lang="en-US" sz="2400" i="1">
                               <a:latin typeface="Cambria Math" panose="02040503050406030204" pitchFamily="18" charset="0"/>
                               <a:cs typeface="Times New Roman" panose="02020603050405020304" pitchFamily="18" charset="0"/>
                             </a:rPr>
@@ -8952,16 +8952,21 @@
                         </m:dPr>
                         <m:e>
                           <m:r>
-                            <a:rPr lang="en-US" sz="2400" b="0" i="1" smtClean="0">
+                            <a:rPr lang="en-US" sz="2400" i="1">
                               <a:latin typeface="Cambria Math" panose="02040503050406030204" pitchFamily="18" charset="0"/>
                               <a:cs typeface="Times New Roman" panose="02020603050405020304" pitchFamily="18" charset="0"/>
                             </a:rPr>
                             <m:t>𝐴</m:t>
                           </m:r>
-                        </m:e>
-                        <m:e>
                           <m:r>
-                            <a:rPr lang="en-US" sz="2400" b="0" i="1" smtClean="0">
+                            <a:rPr lang="en-US" sz="2400" i="1">
+                              <a:latin typeface="Cambria Math" panose="02040503050406030204" pitchFamily="18" charset="0"/>
+                              <a:cs typeface="Times New Roman" panose="02020603050405020304" pitchFamily="18" charset="0"/>
+                            </a:rPr>
+                            <m:t>∩</m:t>
+                          </m:r>
+                          <m:r>
+                            <a:rPr lang="en-US" sz="2400" i="1">
                               <a:latin typeface="Cambria Math" panose="02040503050406030204" pitchFamily="18" charset="0"/>
                               <a:cs typeface="Times New Roman" panose="02020603050405020304" pitchFamily="18" charset="0"/>
                             </a:rPr>
@@ -9064,7 +9069,7 @@
             </p:txBody>
           </p:sp>
         </mc:Choice>
-        <mc:Fallback xmlns="">
+        <mc:Fallback>
           <p:sp>
             <p:nvSpPr>
               <p:cNvPr id="3" name="Content Placeholder 2"/>
@@ -9092,7 +9097,7 @@
               <a:lstStyle/>
               <a:p>
                 <a:r>
-                  <a:rPr lang="en-US">
+                  <a:rPr lang="en-CA">
                     <a:noFill/>
                   </a:rPr>
                   <a:t> </a:t>
@@ -9163,7 +9168,7 @@
 </file>
 
 <file path=ppt/slides/slide12.xml><?xml version="1.0" encoding="utf-8"?>
-<p:sld xmlns:a="http://schemas.openxmlformats.org/drawingml/2006/main" xmlns:r="http://schemas.openxmlformats.org/officeDocument/2006/relationships" xmlns:p="http://schemas.openxmlformats.org/presentationml/2006/main">
+<p:sld xmlns:a="http://schemas.openxmlformats.org/drawingml/2006/main" xmlns:r="http://schemas.openxmlformats.org/officeDocument/2006/relationships" xmlns:p="http://schemas.openxmlformats.org/presentationml/2006/main" show="0">
   <p:cSld>
     <p:spTree>
       <p:nvGrpSpPr>
@@ -10627,7 +10632,7 @@
 </file>
 
 <file path=ppt/slides/slide13.xml><?xml version="1.0" encoding="utf-8"?>
-<p:sld xmlns:a="http://schemas.openxmlformats.org/drawingml/2006/main" xmlns:r="http://schemas.openxmlformats.org/officeDocument/2006/relationships" xmlns:p="http://schemas.openxmlformats.org/presentationml/2006/main">
+<p:sld xmlns:a="http://schemas.openxmlformats.org/drawingml/2006/main" xmlns:r="http://schemas.openxmlformats.org/officeDocument/2006/relationships" xmlns:p="http://schemas.openxmlformats.org/presentationml/2006/main" show="0">
   <p:cSld>
     <p:spTree>
       <p:nvGrpSpPr>
@@ -11607,7 +11612,7 @@
 </file>
 
 <file path=ppt/slides/slide15.xml><?xml version="1.0" encoding="utf-8"?>
-<p:sld xmlns:a="http://schemas.openxmlformats.org/drawingml/2006/main" xmlns:r="http://schemas.openxmlformats.org/officeDocument/2006/relationships" xmlns:p="http://schemas.openxmlformats.org/presentationml/2006/main">
+<p:sld xmlns:a="http://schemas.openxmlformats.org/drawingml/2006/main" xmlns:r="http://schemas.openxmlformats.org/officeDocument/2006/relationships" xmlns:p="http://schemas.openxmlformats.org/presentationml/2006/main" show="0">
   <p:cSld>
     <p:spTree>
       <p:nvGrpSpPr>
@@ -12446,7 +12451,7 @@
 </file>
 
 <file path=ppt/slides/slide16.xml><?xml version="1.0" encoding="utf-8"?>
-<p:sld xmlns:a="http://schemas.openxmlformats.org/drawingml/2006/main" xmlns:r="http://schemas.openxmlformats.org/officeDocument/2006/relationships" xmlns:p="http://schemas.openxmlformats.org/presentationml/2006/main">
+<p:sld xmlns:a="http://schemas.openxmlformats.org/drawingml/2006/main" xmlns:r="http://schemas.openxmlformats.org/officeDocument/2006/relationships" xmlns:p="http://schemas.openxmlformats.org/presentationml/2006/main" show="0">
   <p:cSld>
     <p:spTree>
       <p:nvGrpSpPr>
@@ -15523,8 +15528,8 @@
           </a:p>
         </p:txBody>
       </p:sp>
-      <mc:AlternateContent xmlns:mc="http://schemas.openxmlformats.org/markup-compatibility/2006" xmlns:a14="http://schemas.microsoft.com/office/drawing/2010/main">
-        <mc:Choice Requires="a14">
+      <mc:AlternateContent xmlns:mc="http://schemas.openxmlformats.org/markup-compatibility/2006">
+        <mc:Choice xmlns:a14="http://schemas.microsoft.com/office/drawing/2010/main" Requires="a14">
           <p:sp>
             <p:nvSpPr>
               <p:cNvPr id="3" name="Content Placeholder 2"/>
@@ -15656,83 +15661,78 @@
                               <a:latin typeface="Cambria Math" panose="02040503050406030204" pitchFamily="18" charset="0"/>
                               <a:cs typeface="Times New Roman" panose="02020603050405020304" pitchFamily="18" charset="0"/>
                             </a:rPr>
-                            <m:t>[</m:t>
+                            <m:t>[(</m:t>
                           </m:r>
-                          <m:d>
-                            <m:dPr>
+                          <m:r>
+                            <a:rPr lang="en-US" sz="2400" i="1">
+                              <a:latin typeface="Cambria Math" panose="02040503050406030204" pitchFamily="18" charset="0"/>
+                              <a:cs typeface="Times New Roman" panose="02020603050405020304" pitchFamily="18" charset="0"/>
+                            </a:rPr>
+                            <m:t>𝑋</m:t>
+                          </m:r>
+                          <m:r>
+                            <a:rPr lang="en-US" sz="2400" i="1">
+                              <a:latin typeface="Cambria Math" panose="02040503050406030204" pitchFamily="18" charset="0"/>
+                              <a:cs typeface="Times New Roman" panose="02020603050405020304" pitchFamily="18" charset="0"/>
+                            </a:rPr>
+                            <m:t>−</m:t>
+                          </m:r>
+                          <m:r>
+                            <a:rPr lang="en-US" sz="2400" i="1">
+                              <a:latin typeface="Cambria Math" panose="02040503050406030204" pitchFamily="18" charset="0"/>
+                              <a:cs typeface="Times New Roman" panose="02020603050405020304" pitchFamily="18" charset="0"/>
+                            </a:rPr>
+                            <m:t>𝔼</m:t>
+                          </m:r>
+                          <m:sSup>
+                            <m:sSupPr>
                               <m:ctrlPr>
-                                <a:rPr lang="en-US" sz="2400" b="0" i="1" smtClean="0">
+                                <a:rPr lang="en-US" sz="2400" i="1">
                                   <a:latin typeface="Cambria Math" panose="02040503050406030204" pitchFamily="18" charset="0"/>
                                   <a:cs typeface="Times New Roman" panose="02020603050405020304" pitchFamily="18" charset="0"/>
                                 </a:rPr>
                               </m:ctrlPr>
-                            </m:dPr>
+                            </m:sSupPr>
                             <m:e>
-                              <m:r>
-                                <a:rPr lang="en-US" sz="2400" b="0" i="1" smtClean="0">
-                                  <a:latin typeface="Cambria Math" panose="02040503050406030204" pitchFamily="18" charset="0"/>
-                                  <a:cs typeface="Times New Roman" panose="02020603050405020304" pitchFamily="18" charset="0"/>
-                                </a:rPr>
-                                <m:t>𝑋</m:t>
-                              </m:r>
-                              <m:r>
-                                <a:rPr lang="en-US" sz="2400" b="0" i="1" smtClean="0">
-                                  <a:latin typeface="Cambria Math" panose="02040503050406030204" pitchFamily="18" charset="0"/>
-                                  <a:cs typeface="Times New Roman" panose="02020603050405020304" pitchFamily="18" charset="0"/>
-                                </a:rPr>
-                                <m:t>−</m:t>
-                              </m:r>
-                              <m:r>
-                                <a:rPr lang="en-US" sz="2400" b="0" i="1" smtClean="0">
-                                  <a:latin typeface="Cambria Math" panose="02040503050406030204" pitchFamily="18" charset="0"/>
-                                  <a:cs typeface="Times New Roman" panose="02020603050405020304" pitchFamily="18" charset="0"/>
-                                </a:rPr>
-                                <m:t>𝔼</m:t>
-                              </m:r>
-                              <m:sSup>
-                                <m:sSupPr>
+                              <m:d>
+                                <m:dPr>
+                                  <m:begChr m:val="["/>
+                                  <m:endChr m:val="]"/>
                                   <m:ctrlPr>
-                                    <a:rPr lang="en-US" sz="2400" b="0" i="1" smtClean="0">
+                                    <a:rPr lang="en-US" sz="2400" i="1">
                                       <a:latin typeface="Cambria Math" panose="02040503050406030204" pitchFamily="18" charset="0"/>
                                       <a:cs typeface="Times New Roman" panose="02020603050405020304" pitchFamily="18" charset="0"/>
                                     </a:rPr>
                                   </m:ctrlPr>
-                                </m:sSupPr>
+                                </m:dPr>
                                 <m:e>
-                                  <m:d>
-                                    <m:dPr>
-                                      <m:begChr m:val="["/>
-                                      <m:endChr m:val="]"/>
-                                      <m:ctrlPr>
-                                        <a:rPr lang="en-US" sz="2400" b="0" i="1" smtClean="0">
-                                          <a:latin typeface="Cambria Math" panose="02040503050406030204" pitchFamily="18" charset="0"/>
-                                          <a:cs typeface="Times New Roman" panose="02020603050405020304" pitchFamily="18" charset="0"/>
-                                        </a:rPr>
-                                      </m:ctrlPr>
-                                    </m:dPr>
-                                    <m:e>
-                                      <m:r>
-                                        <a:rPr lang="en-US" sz="2400" b="0" i="1" smtClean="0">
-                                          <a:latin typeface="Cambria Math" panose="02040503050406030204" pitchFamily="18" charset="0"/>
-                                          <a:cs typeface="Times New Roman" panose="02020603050405020304" pitchFamily="18" charset="0"/>
-                                        </a:rPr>
-                                        <m:t>𝑋</m:t>
-                                      </m:r>
-                                    </m:e>
-                                  </m:d>
-                                </m:e>
-                                <m:sup>
                                   <m:r>
-                                    <a:rPr lang="en-US" sz="2400" b="0" i="1" smtClean="0">
+                                    <a:rPr lang="en-US" sz="2400" i="1">
                                       <a:latin typeface="Cambria Math" panose="02040503050406030204" pitchFamily="18" charset="0"/>
                                       <a:cs typeface="Times New Roman" panose="02020603050405020304" pitchFamily="18" charset="0"/>
                                     </a:rPr>
-                                    <m:t>2</m:t>
+                                    <m:t>𝑋</m:t>
                                   </m:r>
-                                </m:sup>
-                              </m:sSup>
+                                </m:e>
+                              </m:d>
+                              <m:r>
+                                <a:rPr lang="en-US" sz="2400" i="1">
+                                  <a:latin typeface="Cambria Math" panose="02040503050406030204" pitchFamily="18" charset="0"/>
+                                  <a:cs typeface="Times New Roman" panose="02020603050405020304" pitchFamily="18" charset="0"/>
+                                </a:rPr>
+                                <m:t>)</m:t>
+                              </m:r>
                             </m:e>
-                          </m:d>
+                            <m:sup>
+                              <m:r>
+                                <a:rPr lang="en-US" sz="2400" i="1">
+                                  <a:latin typeface="Cambria Math" panose="02040503050406030204" pitchFamily="18" charset="0"/>
+                                  <a:cs typeface="Times New Roman" panose="02020603050405020304" pitchFamily="18" charset="0"/>
+                                </a:rPr>
+                                <m:t>2</m:t>
+                              </m:r>
+                            </m:sup>
+                          </m:sSup>
                           <m:r>
                             <a:rPr lang="en-US" sz="2400" b="0" i="1" smtClean="0">
                               <a:latin typeface="Cambria Math" panose="02040503050406030204" pitchFamily="18" charset="0"/>
@@ -16069,7 +16069,7 @@
             </p:txBody>
           </p:sp>
         </mc:Choice>
-        <mc:Fallback xmlns="">
+        <mc:Fallback>
           <p:sp>
             <p:nvSpPr>
               <p:cNvPr id="3" name="Content Placeholder 2"/>
@@ -16097,7 +16097,7 @@
               <a:lstStyle/>
               <a:p>
                 <a:r>
-                  <a:rPr lang="en-US">
+                  <a:rPr lang="en-CA">
                     <a:noFill/>
                   </a:rPr>
                   <a:t> </a:t>
@@ -28628,6 +28628,18 @@
           </a:p>
           <a:p>
             <a:r>
+              <a:rPr lang="en-US" sz="2400" dirty="0">
+                <a:hlinkClick r:id="rId3"/>
+              </a:rPr>
+              <a:t>R project Directory structure | An Introduction to R (intro2r.com)</a:t>
+            </a:r>
+            <a:endParaRPr lang="en-US" sz="2200" dirty="0">
+              <a:latin typeface="Times New Roman" panose="02020603050405020304" pitchFamily="18" charset="0"/>
+              <a:cs typeface="Times New Roman" panose="02020603050405020304" pitchFamily="18" charset="0"/>
+            </a:endParaRPr>
+          </a:p>
+          <a:p>
+            <a:r>
               <a:rPr lang="en-US" sz="2200" dirty="0">
                 <a:latin typeface="Times New Roman" panose="02020603050405020304" pitchFamily="18" charset="0"/>
                 <a:cs typeface="Times New Roman" panose="02020603050405020304" pitchFamily="18" charset="0"/>
@@ -28671,7 +28683,7 @@
           <p:nvPr/>
         </p:nvPicPr>
         <p:blipFill rotWithShape="1">
-          <a:blip r:embed="rId3"/>
+          <a:blip r:embed="rId4"/>
           <a:srcRect l="3008"/>
           <a:stretch/>
         </p:blipFill>
@@ -28700,7 +28712,7 @@
           <p:nvPr/>
         </p:nvPicPr>
         <p:blipFill>
-          <a:blip r:embed="rId4">
+          <a:blip r:embed="rId5">
             <a:extLst>
               <a:ext uri="{28A0092B-C50C-407E-A947-70E740481C1C}">
                 <a14:useLocalDpi xmlns:a14="http://schemas.microsoft.com/office/drawing/2010/main" val="0"/>
@@ -36231,8 +36243,8 @@
           </a:p>
         </p:txBody>
       </p:sp>
-      <mc:AlternateContent xmlns:mc="http://schemas.openxmlformats.org/markup-compatibility/2006" xmlns:a14="http://schemas.microsoft.com/office/drawing/2010/main">
-        <mc:Choice Requires="a14">
+      <mc:AlternateContent xmlns:mc="http://schemas.openxmlformats.org/markup-compatibility/2006">
+        <mc:Choice xmlns:a14="http://schemas.microsoft.com/office/drawing/2010/main" Requires="a14">
           <p:sp>
             <p:nvSpPr>
               <p:cNvPr id="3" name="Content Placeholder 2"/>
@@ -36495,7 +36507,14 @@
                           <m:t>𝑥</m:t>
                         </m:r>
                       </m:num>
-                      <m:den/>
+                      <m:den>
+                        <m:r>
+                          <a:rPr lang="en-US" sz="2400" b="0" i="1" dirty="0" smtClean="0">
+                            <a:latin typeface="Cambria Math" panose="02040503050406030204" pitchFamily="18" charset="0"/>
+                          </a:rPr>
+                          <m:t>𝑛</m:t>
+                        </m:r>
+                      </m:den>
                     </m:f>
                     <m:r>
                       <a:rPr lang="en-US" sz="2400" i="0" dirty="0">
@@ -36751,7 +36770,7 @@
             </p:txBody>
           </p:sp>
         </mc:Choice>
-        <mc:Fallback xmlns="">
+        <mc:Fallback>
           <p:sp>
             <p:nvSpPr>
               <p:cNvPr id="3" name="Content Placeholder 2"/>
@@ -36779,7 +36798,7 @@
               <a:lstStyle/>
               <a:p>
                 <a:r>
-                  <a:rPr lang="en-US">
+                  <a:rPr lang="en-CA">
                     <a:noFill/>
                   </a:rPr>
                   <a:t> </a:t>

</xml_diff>